<commit_message>
Atualização do README de T1
</commit_message>
<xml_diff>
--- a/Docs/ADSL - Apresentação Final.pptx
+++ b/Docs/ADSL - Apresentação Final.pptx
@@ -39,11 +39,6 @@
       <p:bold r:id="rId20"/>
       <p:italic r:id="rId21"/>
       <p:boldItalic r:id="rId22"/>
-    </p:embeddedFont>
-    <p:embeddedFont>
-      <p:font typeface="Roboto Medium" panose="02000000000000000000" pitchFamily="2" charset="0"/>
-      <p:regular r:id="rId23"/>
-      <p:italic r:id="rId24"/>
     </p:embeddedFont>
   </p:embeddedFontLst>
   <p:defaultTextStyle>
@@ -300,7 +295,7 @@
 <file path=ppt/revisionInfo.xml><?xml version="1.0" encoding="utf-8"?>
 <p1510:revInfo xmlns:a="http://schemas.openxmlformats.org/drawingml/2006/main" xmlns:r="http://schemas.openxmlformats.org/officeDocument/2006/relationships" xmlns:p1510="http://schemas.microsoft.com/office/powerpoint/2015/10/main">
   <p1510:revLst>
-    <p1510:client id="{40DFF169-7561-40EC-88FF-FDA9A208B68C}" v="25" dt="2025-11-22T22:05:23.233"/>
+    <p1510:client id="{C6AF067A-1F3F-6276-FF2B-315D60384CD9}" v="8" dt="2025-11-25T02:01:23.469"/>
   </p1510:revLst>
 </p1510:revInfo>
 </file>
@@ -326,6 +321,46 @@
     </pc:docChg>
   </pc:docChgLst>
   <pc:docChgLst>
+    <pc:chgData name="Usuário Convidado" providerId="Windows Live" clId="Web-{C6AF067A-1F3F-6276-FF2B-315D60384CD9}"/>
+    <pc:docChg chg="addSld delSld modSld">
+      <pc:chgData name="Usuário Convidado" userId="" providerId="Windows Live" clId="Web-{C6AF067A-1F3F-6276-FF2B-315D60384CD9}" dt="2025-11-25T02:01:23.469" v="7"/>
+      <pc:docMkLst>
+        <pc:docMk/>
+      </pc:docMkLst>
+      <pc:sldChg chg="addSp delSp modSp add del replId">
+        <pc:chgData name="Usuário Convidado" userId="" providerId="Windows Live" clId="Web-{C6AF067A-1F3F-6276-FF2B-315D60384CD9}" dt="2025-11-25T02:01:23.469" v="7"/>
+        <pc:sldMkLst>
+          <pc:docMk/>
+          <pc:sldMk cId="4269877453" sldId="285"/>
+        </pc:sldMkLst>
+        <pc:spChg chg="add del mod">
+          <ac:chgData name="Usuário Convidado" userId="" providerId="Windows Live" clId="Web-{C6AF067A-1F3F-6276-FF2B-315D60384CD9}" dt="2025-11-25T02:00:34.531" v="6"/>
+          <ac:spMkLst>
+            <pc:docMk/>
+            <pc:sldMk cId="4269877453" sldId="285"/>
+            <ac:spMk id="2" creationId="{00629F20-F72C-8D0F-513C-2591D723C454}"/>
+          </ac:spMkLst>
+        </pc:spChg>
+        <pc:picChg chg="del">
+          <ac:chgData name="Usuário Convidado" userId="" providerId="Windows Live" clId="Web-{C6AF067A-1F3F-6276-FF2B-315D60384CD9}" dt="2025-11-25T02:00:23.656" v="1"/>
+          <ac:picMkLst>
+            <pc:docMk/>
+            <pc:sldMk cId="4269877453" sldId="285"/>
+            <ac:picMk id="3" creationId="{0D20B59F-A746-6A4E-145C-C8DBEA8E4A3B}"/>
+          </ac:picMkLst>
+        </pc:picChg>
+        <pc:picChg chg="del">
+          <ac:chgData name="Usuário Convidado" userId="" providerId="Windows Live" clId="Web-{C6AF067A-1F3F-6276-FF2B-315D60384CD9}" dt="2025-11-25T02:00:24.094" v="2"/>
+          <ac:picMkLst>
+            <pc:docMk/>
+            <pc:sldMk cId="4269877453" sldId="285"/>
+            <ac:picMk id="7" creationId="{5CE8F922-41DA-5058-62C0-D38311A47453}"/>
+          </ac:picMkLst>
+        </pc:picChg>
+      </pc:sldChg>
+    </pc:docChg>
+  </pc:docChgLst>
+  <pc:docChgLst>
     <pc:chgData name="Marcus Vinícius de Faria Santos" userId="f3ba05d3ad3c9305" providerId="LiveId" clId="{744A556E-C55C-43AE-946F-9917EC8125F8}"/>
     <pc:docChg chg="undo custSel addSld delSld modSld sldOrd">
       <pc:chgData name="Marcus Vinícius de Faria Santos" userId="f3ba05d3ad3c9305" providerId="LiveId" clId="{744A556E-C55C-43AE-946F-9917EC8125F8}" dt="2025-11-22T22:05:27.278" v="1119" actId="20577"/>
@@ -347,34 +382,6 @@
           </ac:spMkLst>
         </pc:spChg>
       </pc:sldChg>
-      <pc:sldChg chg="del ord">
-        <pc:chgData name="Marcus Vinícius de Faria Santos" userId="f3ba05d3ad3c9305" providerId="LiveId" clId="{744A556E-C55C-43AE-946F-9917EC8125F8}" dt="2025-11-22T20:33:07.810" v="1007" actId="47"/>
-        <pc:sldMkLst>
-          <pc:docMk/>
-          <pc:sldMk cId="0" sldId="260"/>
-        </pc:sldMkLst>
-      </pc:sldChg>
-      <pc:sldChg chg="del ord">
-        <pc:chgData name="Marcus Vinícius de Faria Santos" userId="f3ba05d3ad3c9305" providerId="LiveId" clId="{744A556E-C55C-43AE-946F-9917EC8125F8}" dt="2025-11-22T20:33:07.810" v="1007" actId="47"/>
-        <pc:sldMkLst>
-          <pc:docMk/>
-          <pc:sldMk cId="0" sldId="261"/>
-        </pc:sldMkLst>
-      </pc:sldChg>
-      <pc:sldChg chg="del ord">
-        <pc:chgData name="Marcus Vinícius de Faria Santos" userId="f3ba05d3ad3c9305" providerId="LiveId" clId="{744A556E-C55C-43AE-946F-9917EC8125F8}" dt="2025-11-22T20:33:07.810" v="1007" actId="47"/>
-        <pc:sldMkLst>
-          <pc:docMk/>
-          <pc:sldMk cId="2299977668" sldId="276"/>
-        </pc:sldMkLst>
-      </pc:sldChg>
-      <pc:sldChg chg="modSp new del mod ord">
-        <pc:chgData name="Marcus Vinícius de Faria Santos" userId="f3ba05d3ad3c9305" providerId="LiveId" clId="{744A556E-C55C-43AE-946F-9917EC8125F8}" dt="2025-11-22T20:33:07.810" v="1007" actId="47"/>
-        <pc:sldMkLst>
-          <pc:docMk/>
-          <pc:sldMk cId="989634489" sldId="277"/>
-        </pc:sldMkLst>
-      </pc:sldChg>
       <pc:sldChg chg="addSp delSp modSp add mod">
         <pc:chgData name="Marcus Vinícius de Faria Santos" userId="f3ba05d3ad3c9305" providerId="LiveId" clId="{744A556E-C55C-43AE-946F-9917EC8125F8}" dt="2025-11-22T22:05:27.278" v="1119" actId="20577"/>
         <pc:sldMkLst>
@@ -395,14 +402,6 @@
             <pc:docMk/>
             <pc:sldMk cId="695107363" sldId="278"/>
             <ac:spMk id="5" creationId="{D4B6CF4C-F897-00CC-F104-A742A5D0107B}"/>
-          </ac:spMkLst>
-        </pc:spChg>
-        <pc:spChg chg="add del mod ord">
-          <ac:chgData name="Marcus Vinícius de Faria Santos" userId="f3ba05d3ad3c9305" providerId="LiveId" clId="{744A556E-C55C-43AE-946F-9917EC8125F8}" dt="2025-11-22T19:42:00.147" v="512" actId="478"/>
-          <ac:spMkLst>
-            <pc:docMk/>
-            <pc:sldMk cId="695107363" sldId="278"/>
-            <ac:spMk id="6" creationId="{F7C2E388-FC16-F01E-6A91-2B1C3A575944}"/>
           </ac:spMkLst>
         </pc:spChg>
         <pc:spChg chg="add mod">
@@ -469,14 +468,6 @@
             <ac:spMk id="72" creationId="{9C3FE1C2-66A9-B7A1-63EA-8BD5026389B3}"/>
           </ac:spMkLst>
         </pc:spChg>
-        <pc:picChg chg="del">
-          <ac:chgData name="Marcus Vinícius de Faria Santos" userId="f3ba05d3ad3c9305" providerId="LiveId" clId="{744A556E-C55C-43AE-946F-9917EC8125F8}" dt="2025-11-22T19:31:49.840" v="32" actId="478"/>
-          <ac:picMkLst>
-            <pc:docMk/>
-            <pc:sldMk cId="695107363" sldId="278"/>
-            <ac:picMk id="13" creationId="{04B881F2-8444-7A6D-3644-190297B3B14F}"/>
-          </ac:picMkLst>
-        </pc:picChg>
       </pc:sldChg>
       <pc:sldChg chg="addSp modSp new mod">
         <pc:chgData name="Marcus Vinícius de Faria Santos" userId="f3ba05d3ad3c9305" providerId="LiveId" clId="{744A556E-C55C-43AE-946F-9917EC8125F8}" dt="2025-11-22T19:51:48.545" v="759" actId="1076"/>
@@ -531,36 +522,12 @@
             <ac:spMk id="3" creationId="{24A01E40-FE26-DBDA-8972-9FBF67BCA8AA}"/>
           </ac:spMkLst>
         </pc:spChg>
-        <pc:spChg chg="add del">
-          <ac:chgData name="Marcus Vinícius de Faria Santos" userId="f3ba05d3ad3c9305" providerId="LiveId" clId="{744A556E-C55C-43AE-946F-9917EC8125F8}" dt="2025-11-22T19:54:19.730" v="801" actId="22"/>
-          <ac:spMkLst>
-            <pc:docMk/>
-            <pc:sldMk cId="1430541128" sldId="280"/>
-            <ac:spMk id="5" creationId="{973B35C0-40AF-95E1-F0E2-C672B306B2C3}"/>
-          </ac:spMkLst>
-        </pc:spChg>
-        <pc:spChg chg="add del mod">
-          <ac:chgData name="Marcus Vinícius de Faria Santos" userId="f3ba05d3ad3c9305" providerId="LiveId" clId="{744A556E-C55C-43AE-946F-9917EC8125F8}" dt="2025-11-22T19:55:13.237" v="825"/>
-          <ac:spMkLst>
-            <pc:docMk/>
-            <pc:sldMk cId="1430541128" sldId="280"/>
-            <ac:spMk id="7" creationId="{64C781B5-77CF-C4BD-F1EB-14DE2B117FF3}"/>
-          </ac:spMkLst>
-        </pc:spChg>
         <pc:spChg chg="add mod">
           <ac:chgData name="Marcus Vinícius de Faria Santos" userId="f3ba05d3ad3c9305" providerId="LiveId" clId="{744A556E-C55C-43AE-946F-9917EC8125F8}" dt="2025-11-22T20:00:06.457" v="931" actId="14100"/>
           <ac:spMkLst>
             <pc:docMk/>
             <pc:sldMk cId="1430541128" sldId="280"/>
             <ac:spMk id="8" creationId="{CDE9C621-E8AD-BFA2-52F6-027283ABD9A9}"/>
-          </ac:spMkLst>
-        </pc:spChg>
-        <pc:spChg chg="add del mod">
-          <ac:chgData name="Marcus Vinícius de Faria Santos" userId="f3ba05d3ad3c9305" providerId="LiveId" clId="{744A556E-C55C-43AE-946F-9917EC8125F8}" dt="2025-11-22T19:56:23.271" v="837" actId="478"/>
-          <ac:spMkLst>
-            <pc:docMk/>
-            <pc:sldMk cId="1430541128" sldId="280"/>
-            <ac:spMk id="9" creationId="{7292B442-2CAF-C4BE-B44B-C598BBBBE2B4}"/>
           </ac:spMkLst>
         </pc:spChg>
         <pc:spChg chg="add mod">
@@ -594,46 +561,6 @@
             <ac:spMk id="2" creationId="{D8055148-110D-2861-DD7E-9BC903C70E69}"/>
           </ac:spMkLst>
         </pc:spChg>
-        <pc:spChg chg="del">
-          <ac:chgData name="Marcus Vinícius de Faria Santos" userId="f3ba05d3ad3c9305" providerId="LiveId" clId="{744A556E-C55C-43AE-946F-9917EC8125F8}" dt="2025-11-22T20:28:58.559" v="990" actId="478"/>
-          <ac:spMkLst>
-            <pc:docMk/>
-            <pc:sldMk cId="868164020" sldId="281"/>
-            <ac:spMk id="3" creationId="{7BCBA702-9AB3-D67F-91B8-8223485B458F}"/>
-          </ac:spMkLst>
-        </pc:spChg>
-        <pc:spChg chg="add del mod">
-          <ac:chgData name="Marcus Vinícius de Faria Santos" userId="f3ba05d3ad3c9305" providerId="LiveId" clId="{744A556E-C55C-43AE-946F-9917EC8125F8}" dt="2025-11-22T20:29:00.581" v="991" actId="478"/>
-          <ac:spMkLst>
-            <pc:docMk/>
-            <pc:sldMk cId="868164020" sldId="281"/>
-            <ac:spMk id="5" creationId="{BB88EAC3-288B-6834-AABC-10B5D3FE18B2}"/>
-          </ac:spMkLst>
-        </pc:spChg>
-        <pc:spChg chg="del">
-          <ac:chgData name="Marcus Vinícius de Faria Santos" userId="f3ba05d3ad3c9305" providerId="LiveId" clId="{744A556E-C55C-43AE-946F-9917EC8125F8}" dt="2025-11-22T20:28:57.734" v="989" actId="478"/>
-          <ac:spMkLst>
-            <pc:docMk/>
-            <pc:sldMk cId="868164020" sldId="281"/>
-            <ac:spMk id="8" creationId="{92503E38-5338-CAF3-8717-44A0AE3C30E0}"/>
-          </ac:spMkLst>
-        </pc:spChg>
-        <pc:spChg chg="del">
-          <ac:chgData name="Marcus Vinícius de Faria Santos" userId="f3ba05d3ad3c9305" providerId="LiveId" clId="{744A556E-C55C-43AE-946F-9917EC8125F8}" dt="2025-11-22T20:29:01.667" v="992" actId="478"/>
-          <ac:spMkLst>
-            <pc:docMk/>
-            <pc:sldMk cId="868164020" sldId="281"/>
-            <ac:spMk id="10" creationId="{3C2444AC-B973-A1F0-775A-8C6603014046}"/>
-          </ac:spMkLst>
-        </pc:spChg>
-        <pc:spChg chg="del">
-          <ac:chgData name="Marcus Vinícius de Faria Santos" userId="f3ba05d3ad3c9305" providerId="LiveId" clId="{744A556E-C55C-43AE-946F-9917EC8125F8}" dt="2025-11-22T20:29:02.402" v="993" actId="478"/>
-          <ac:spMkLst>
-            <pc:docMk/>
-            <pc:sldMk cId="868164020" sldId="281"/>
-            <ac:spMk id="11" creationId="{EAE72084-63E1-96FA-926E-38C23FA5CE16}"/>
-          </ac:spMkLst>
-        </pc:spChg>
         <pc:picChg chg="add mod">
           <ac:chgData name="Marcus Vinícius de Faria Santos" userId="f3ba05d3ad3c9305" providerId="LiveId" clId="{744A556E-C55C-43AE-946F-9917EC8125F8}" dt="2025-11-22T20:31:51.105" v="1006" actId="1076"/>
           <ac:picMkLst>
@@ -663,14 +590,6 @@
             <pc:docMk/>
             <pc:sldMk cId="3625576380" sldId="282"/>
             <ac:spMk id="2" creationId="{1E296379-3D96-CAA7-28BD-63FB7B89CDC0}"/>
-          </ac:spMkLst>
-        </pc:spChg>
-        <pc:spChg chg="del">
-          <ac:chgData name="Marcus Vinícius de Faria Santos" userId="f3ba05d3ad3c9305" providerId="LiveId" clId="{744A556E-C55C-43AE-946F-9917EC8125F8}" dt="2025-11-22T20:36:12.862" v="1017" actId="478"/>
-          <ac:spMkLst>
-            <pc:docMk/>
-            <pc:sldMk cId="3625576380" sldId="282"/>
-            <ac:spMk id="3" creationId="{05A978B2-B687-3EC8-0E5B-2E0862768A24}"/>
           </ac:spMkLst>
         </pc:spChg>
         <pc:picChg chg="add mod">
@@ -712,22 +631,6 @@
             <ac:picMk id="4" creationId="{B7E8F333-46D8-03F1-E67F-EF5303BE477A}"/>
           </ac:picMkLst>
         </pc:picChg>
-        <pc:picChg chg="del">
-          <ac:chgData name="Marcus Vinícius de Faria Santos" userId="f3ba05d3ad3c9305" providerId="LiveId" clId="{744A556E-C55C-43AE-946F-9917EC8125F8}" dt="2025-11-22T20:38:56.282" v="1054" actId="478"/>
-          <ac:picMkLst>
-            <pc:docMk/>
-            <pc:sldMk cId="683614194" sldId="283"/>
-            <ac:picMk id="5" creationId="{123B6FC3-B9FF-B3B9-5D01-F9CBAD502322}"/>
-          </ac:picMkLst>
-        </pc:picChg>
-        <pc:picChg chg="del">
-          <ac:chgData name="Marcus Vinícius de Faria Santos" userId="f3ba05d3ad3c9305" providerId="LiveId" clId="{744A556E-C55C-43AE-946F-9917EC8125F8}" dt="2025-11-22T20:39:16.889" v="1061" actId="478"/>
-          <ac:picMkLst>
-            <pc:docMk/>
-            <pc:sldMk cId="683614194" sldId="283"/>
-            <ac:picMk id="7" creationId="{D4C679A6-A49B-D116-7D27-26FC19A34424}"/>
-          </ac:picMkLst>
-        </pc:picChg>
         <pc:picChg chg="add mod">
           <ac:chgData name="Marcus Vinícius de Faria Santos" userId="f3ba05d3ad3c9305" providerId="LiveId" clId="{744A556E-C55C-43AE-946F-9917EC8125F8}" dt="2025-11-22T20:42:30.803" v="1074" actId="1076"/>
           <ac:picMkLst>
@@ -751,14 +654,6 @@
             <ac:spMk id="2" creationId="{E9303BF8-3841-52C4-BF89-9E1DF73C53DE}"/>
           </ac:spMkLst>
         </pc:spChg>
-        <pc:picChg chg="del">
-          <ac:chgData name="Marcus Vinícius de Faria Santos" userId="f3ba05d3ad3c9305" providerId="LiveId" clId="{744A556E-C55C-43AE-946F-9917EC8125F8}" dt="2025-11-22T20:43:00.654" v="1081" actId="478"/>
-          <ac:picMkLst>
-            <pc:docMk/>
-            <pc:sldMk cId="3660645131" sldId="284"/>
-            <ac:picMk id="4" creationId="{A4D57721-DBCD-2FF6-69C2-71694A15462B}"/>
-          </ac:picMkLst>
-        </pc:picChg>
         <pc:picChg chg="add mod">
           <ac:chgData name="Marcus Vinícius de Faria Santos" userId="f3ba05d3ad3c9305" providerId="LiveId" clId="{744A556E-C55C-43AE-946F-9917EC8125F8}" dt="2025-11-22T20:44:01.252" v="1094" actId="1076"/>
           <ac:picMkLst>
@@ -773,14 +668,6 @@
             <pc:docMk/>
             <pc:sldMk cId="3660645131" sldId="284"/>
             <ac:picMk id="7" creationId="{55A6AC96-09E0-F38F-EA2D-2A2134643A06}"/>
-          </ac:picMkLst>
-        </pc:picChg>
-        <pc:picChg chg="del">
-          <ac:chgData name="Marcus Vinícius de Faria Santos" userId="f3ba05d3ad3c9305" providerId="LiveId" clId="{744A556E-C55C-43AE-946F-9917EC8125F8}" dt="2025-11-22T20:43:01.108" v="1082" actId="478"/>
-          <ac:picMkLst>
-            <pc:docMk/>
-            <pc:sldMk cId="3660645131" sldId="284"/>
-            <ac:picMk id="8" creationId="{95A201EE-35CD-D877-AB36-3C8C9FC69834}"/>
           </ac:picMkLst>
         </pc:picChg>
       </pc:sldChg>
@@ -887,7 +774,7 @@
               <a:rPr lang="pt-BR" smtClean="0">
                 <a:latin typeface="Arial" panose="020B0604020202020204" pitchFamily="34" charset="0"/>
               </a:rPr>
-              <a:t>22/11/2025</a:t>
+              <a:t>24/11/2025</a:t>
             </a:fld>
             <a:endParaRPr lang="pt-BR">
               <a:latin typeface="Arial" panose="020B0604020202020204" pitchFamily="34" charset="0"/>

</xml_diff>